<commit_message>
Some tweaks to the Spring configs to reflect good practice, slides updated
</commit_message>
<xml_diff>
--- a/Spring + Hibernate.pptx
+++ b/Spring + Hibernate.pptx
@@ -21,7 +21,10 @@
     <p:sldId id="269" r:id="rId15"/>
     <p:sldId id="270" r:id="rId16"/>
     <p:sldId id="271" r:id="rId17"/>
-    <p:sldId id="272" r:id="rId18"/>
+    <p:sldId id="275" r:id="rId18"/>
+    <p:sldId id="272" r:id="rId19"/>
+    <p:sldId id="273" r:id="rId20"/>
+    <p:sldId id="274" r:id="rId21"/>
   </p:sldIdLst>
   <p:sldSz cx="9144000" cy="6858000" type="screen4x3"/>
   <p:notesSz cx="6858000" cy="9144000"/>
@@ -304,7 +307,8 @@
           <a:p>
             <a:fld id="{F1F6951F-1DFC-44F2-B12D-F691ACE09490}" type="datetimeFigureOut">
               <a:rPr lang="en-GB" smtClean="0"/>
-              <a:t>07/02/2011</a:t>
+              <a:pPr/>
+              <a:t>08/02/2011</a:t>
             </a:fld>
             <a:endParaRPr lang="en-GB"/>
           </a:p>
@@ -346,6 +350,7 @@
           <a:p>
             <a:fld id="{415E8EC0-A4AB-4C78-B856-D6B84FBF519B}" type="slidenum">
               <a:rPr lang="en-GB" smtClean="0"/>
+              <a:pPr/>
               <a:t>‹#›</a:t>
             </a:fld>
             <a:endParaRPr lang="en-GB"/>
@@ -469,7 +474,8 @@
           <a:p>
             <a:fld id="{F1F6951F-1DFC-44F2-B12D-F691ACE09490}" type="datetimeFigureOut">
               <a:rPr lang="en-GB" smtClean="0"/>
-              <a:t>07/02/2011</a:t>
+              <a:pPr/>
+              <a:t>08/02/2011</a:t>
             </a:fld>
             <a:endParaRPr lang="en-GB"/>
           </a:p>
@@ -511,6 +517,7 @@
           <a:p>
             <a:fld id="{415E8EC0-A4AB-4C78-B856-D6B84FBF519B}" type="slidenum">
               <a:rPr lang="en-GB" smtClean="0"/>
+              <a:pPr/>
               <a:t>‹#›</a:t>
             </a:fld>
             <a:endParaRPr lang="en-GB"/>
@@ -644,7 +651,8 @@
           <a:p>
             <a:fld id="{F1F6951F-1DFC-44F2-B12D-F691ACE09490}" type="datetimeFigureOut">
               <a:rPr lang="en-GB" smtClean="0"/>
-              <a:t>07/02/2011</a:t>
+              <a:pPr/>
+              <a:t>08/02/2011</a:t>
             </a:fld>
             <a:endParaRPr lang="en-GB"/>
           </a:p>
@@ -686,6 +694,7 @@
           <a:p>
             <a:fld id="{415E8EC0-A4AB-4C78-B856-D6B84FBF519B}" type="slidenum">
               <a:rPr lang="en-GB" smtClean="0"/>
+              <a:pPr/>
               <a:t>‹#›</a:t>
             </a:fld>
             <a:endParaRPr lang="en-GB"/>
@@ -809,7 +818,8 @@
           <a:p>
             <a:fld id="{F1F6951F-1DFC-44F2-B12D-F691ACE09490}" type="datetimeFigureOut">
               <a:rPr lang="en-GB" smtClean="0"/>
-              <a:t>07/02/2011</a:t>
+              <a:pPr/>
+              <a:t>08/02/2011</a:t>
             </a:fld>
             <a:endParaRPr lang="en-GB"/>
           </a:p>
@@ -851,6 +861,7 @@
           <a:p>
             <a:fld id="{415E8EC0-A4AB-4C78-B856-D6B84FBF519B}" type="slidenum">
               <a:rPr lang="en-GB" smtClean="0"/>
+              <a:pPr/>
               <a:t>‹#›</a:t>
             </a:fld>
             <a:endParaRPr lang="en-GB"/>
@@ -1050,7 +1061,8 @@
           <a:p>
             <a:fld id="{F1F6951F-1DFC-44F2-B12D-F691ACE09490}" type="datetimeFigureOut">
               <a:rPr lang="en-GB" smtClean="0"/>
-              <a:t>07/02/2011</a:t>
+              <a:pPr/>
+              <a:t>08/02/2011</a:t>
             </a:fld>
             <a:endParaRPr lang="en-GB"/>
           </a:p>
@@ -1092,6 +1104,7 @@
           <a:p>
             <a:fld id="{415E8EC0-A4AB-4C78-B856-D6B84FBF519B}" type="slidenum">
               <a:rPr lang="en-GB" smtClean="0"/>
+              <a:pPr/>
               <a:t>‹#›</a:t>
             </a:fld>
             <a:endParaRPr lang="en-GB"/>
@@ -1333,7 +1346,8 @@
           <a:p>
             <a:fld id="{F1F6951F-1DFC-44F2-B12D-F691ACE09490}" type="datetimeFigureOut">
               <a:rPr lang="en-GB" smtClean="0"/>
-              <a:t>07/02/2011</a:t>
+              <a:pPr/>
+              <a:t>08/02/2011</a:t>
             </a:fld>
             <a:endParaRPr lang="en-GB"/>
           </a:p>
@@ -1375,6 +1389,7 @@
           <a:p>
             <a:fld id="{415E8EC0-A4AB-4C78-B856-D6B84FBF519B}" type="slidenum">
               <a:rPr lang="en-GB" smtClean="0"/>
+              <a:pPr/>
               <a:t>‹#›</a:t>
             </a:fld>
             <a:endParaRPr lang="en-GB"/>
@@ -1750,7 +1765,8 @@
           <a:p>
             <a:fld id="{F1F6951F-1DFC-44F2-B12D-F691ACE09490}" type="datetimeFigureOut">
               <a:rPr lang="en-GB" smtClean="0"/>
-              <a:t>07/02/2011</a:t>
+              <a:pPr/>
+              <a:t>08/02/2011</a:t>
             </a:fld>
             <a:endParaRPr lang="en-GB"/>
           </a:p>
@@ -1792,6 +1808,7 @@
           <a:p>
             <a:fld id="{415E8EC0-A4AB-4C78-B856-D6B84FBF519B}" type="slidenum">
               <a:rPr lang="en-GB" smtClean="0"/>
+              <a:pPr/>
               <a:t>‹#›</a:t>
             </a:fld>
             <a:endParaRPr lang="en-GB"/>
@@ -1863,7 +1880,8 @@
           <a:p>
             <a:fld id="{F1F6951F-1DFC-44F2-B12D-F691ACE09490}" type="datetimeFigureOut">
               <a:rPr lang="en-GB" smtClean="0"/>
-              <a:t>07/02/2011</a:t>
+              <a:pPr/>
+              <a:t>08/02/2011</a:t>
             </a:fld>
             <a:endParaRPr lang="en-GB"/>
           </a:p>
@@ -1905,6 +1923,7 @@
           <a:p>
             <a:fld id="{415E8EC0-A4AB-4C78-B856-D6B84FBF519B}" type="slidenum">
               <a:rPr lang="en-GB" smtClean="0"/>
+              <a:pPr/>
               <a:t>‹#›</a:t>
             </a:fld>
             <a:endParaRPr lang="en-GB"/>
@@ -1953,7 +1972,8 @@
           <a:p>
             <a:fld id="{F1F6951F-1DFC-44F2-B12D-F691ACE09490}" type="datetimeFigureOut">
               <a:rPr lang="en-GB" smtClean="0"/>
-              <a:t>07/02/2011</a:t>
+              <a:pPr/>
+              <a:t>08/02/2011</a:t>
             </a:fld>
             <a:endParaRPr lang="en-GB"/>
           </a:p>
@@ -1995,6 +2015,7 @@
           <a:p>
             <a:fld id="{415E8EC0-A4AB-4C78-B856-D6B84FBF519B}" type="slidenum">
               <a:rPr lang="en-GB" smtClean="0"/>
+              <a:pPr/>
               <a:t>‹#›</a:t>
             </a:fld>
             <a:endParaRPr lang="en-GB"/>
@@ -2225,7 +2246,8 @@
           <a:p>
             <a:fld id="{F1F6951F-1DFC-44F2-B12D-F691ACE09490}" type="datetimeFigureOut">
               <a:rPr lang="en-GB" smtClean="0"/>
-              <a:t>07/02/2011</a:t>
+              <a:pPr/>
+              <a:t>08/02/2011</a:t>
             </a:fld>
             <a:endParaRPr lang="en-GB"/>
           </a:p>
@@ -2267,6 +2289,7 @@
           <a:p>
             <a:fld id="{415E8EC0-A4AB-4C78-B856-D6B84FBF519B}" type="slidenum">
               <a:rPr lang="en-GB" smtClean="0"/>
+              <a:pPr/>
               <a:t>‹#›</a:t>
             </a:fld>
             <a:endParaRPr lang="en-GB"/>
@@ -2473,7 +2496,8 @@
           <a:p>
             <a:fld id="{F1F6951F-1DFC-44F2-B12D-F691ACE09490}" type="datetimeFigureOut">
               <a:rPr lang="en-GB" smtClean="0"/>
-              <a:t>07/02/2011</a:t>
+              <a:pPr/>
+              <a:t>08/02/2011</a:t>
             </a:fld>
             <a:endParaRPr lang="en-GB"/>
           </a:p>
@@ -2515,6 +2539,7 @@
           <a:p>
             <a:fld id="{415E8EC0-A4AB-4C78-B856-D6B84FBF519B}" type="slidenum">
               <a:rPr lang="en-GB" smtClean="0"/>
+              <a:pPr/>
               <a:t>‹#›</a:t>
             </a:fld>
             <a:endParaRPr lang="en-GB"/>
@@ -2681,7 +2706,8 @@
           <a:p>
             <a:fld id="{F1F6951F-1DFC-44F2-B12D-F691ACE09490}" type="datetimeFigureOut">
               <a:rPr lang="en-GB" smtClean="0"/>
-              <a:t>07/02/2011</a:t>
+              <a:pPr/>
+              <a:t>08/02/2011</a:t>
             </a:fld>
             <a:endParaRPr lang="en-GB"/>
           </a:p>
@@ -2759,6 +2785,7 @@
           <a:p>
             <a:fld id="{415E8EC0-A4AB-4C78-B856-D6B84FBF519B}" type="slidenum">
               <a:rPr lang="en-GB" smtClean="0"/>
+              <a:pPr/>
               <a:t>‹#›</a:t>
             </a:fld>
             <a:endParaRPr lang="en-GB"/>
@@ -3939,6 +3966,356 @@
         </p:nvSpPr>
         <p:spPr/>
         <p:txBody>
+          <a:bodyPr>
+            <a:normAutofit/>
+          </a:bodyPr>
+          <a:lstStyle/>
+          <a:p>
+            <a:r>
+              <a:rPr lang="en-GB" dirty="0" smtClean="0"/>
+              <a:t>Good habits for Spring …</a:t>
+            </a:r>
+            <a:endParaRPr lang="en-GB" dirty="0"/>
+          </a:p>
+        </p:txBody>
+      </p:sp>
+      <p:sp>
+        <p:nvSpPr>
+          <p:cNvPr id="3" name="Content Placeholder 2"/>
+          <p:cNvSpPr>
+            <a:spLocks noGrp="1"/>
+          </p:cNvSpPr>
+          <p:nvPr>
+            <p:ph idx="1"/>
+          </p:nvPr>
+        </p:nvSpPr>
+        <p:spPr/>
+        <p:txBody>
+          <a:bodyPr>
+            <a:normAutofit fontScale="92500" lnSpcReduction="10000"/>
+          </a:bodyPr>
+          <a:lstStyle/>
+          <a:p>
+            <a:r>
+              <a:rPr lang="en-GB" dirty="0" smtClean="0"/>
+              <a:t>Treat the bean definitions as code</a:t>
+            </a:r>
+          </a:p>
+          <a:p>
+            <a:pPr lvl="1"/>
+            <a:r>
+              <a:rPr lang="en-GB" dirty="0" smtClean="0"/>
+              <a:t>Name things well</a:t>
+            </a:r>
+          </a:p>
+          <a:p>
+            <a:pPr lvl="1"/>
+            <a:r>
+              <a:rPr lang="en-GB" dirty="0" smtClean="0"/>
+              <a:t>Test, test, test, …</a:t>
+            </a:r>
+          </a:p>
+          <a:p>
+            <a:r>
+              <a:rPr lang="en-GB" dirty="0" smtClean="0"/>
+              <a:t>Use the Spring test support</a:t>
+            </a:r>
+          </a:p>
+          <a:p>
+            <a:pPr lvl="1"/>
+            <a:r>
+              <a:rPr lang="en-GB" dirty="0" smtClean="0"/>
+              <a:t>Beans should be unit-testable in isolation </a:t>
+            </a:r>
+          </a:p>
+          <a:p>
+            <a:pPr lvl="1"/>
+            <a:r>
+              <a:rPr lang="en-GB" dirty="0" smtClean="0"/>
+              <a:t>Integration testing</a:t>
+            </a:r>
+          </a:p>
+          <a:p>
+            <a:pPr lvl="2"/>
+            <a:r>
+              <a:rPr lang="en-GB" dirty="0" smtClean="0">
+                <a:solidFill>
+                  <a:schemeClr val="accent2"/>
+                </a:solidFill>
+              </a:rPr>
+              <a:t>@</a:t>
+            </a:r>
+            <a:r>
+              <a:rPr lang="en-GB" dirty="0" err="1" smtClean="0">
+                <a:solidFill>
+                  <a:schemeClr val="accent2"/>
+                </a:solidFill>
+              </a:rPr>
+              <a:t>ContextConfiguration</a:t>
+            </a:r>
+            <a:r>
+              <a:rPr lang="en-GB" dirty="0" smtClean="0">
+                <a:solidFill>
+                  <a:schemeClr val="accent2"/>
+                </a:solidFill>
+              </a:rPr>
+              <a:t> </a:t>
+            </a:r>
+            <a:r>
+              <a:rPr lang="en-GB" dirty="0" smtClean="0"/>
+              <a:t>– create the Spring context</a:t>
+            </a:r>
+          </a:p>
+          <a:p>
+            <a:pPr lvl="2"/>
+            <a:r>
+              <a:rPr lang="en-GB" dirty="0" smtClean="0">
+                <a:solidFill>
+                  <a:schemeClr val="accent2"/>
+                </a:solidFill>
+              </a:rPr>
+              <a:t>@Rollback </a:t>
+            </a:r>
+            <a:r>
+              <a:rPr lang="en-GB" dirty="0" smtClean="0"/>
+              <a:t>– cleanup changes to a database </a:t>
+            </a:r>
+          </a:p>
+          <a:p>
+            <a:pPr lvl="2"/>
+            <a:r>
+              <a:rPr lang="en-GB" dirty="0" smtClean="0">
+                <a:solidFill>
+                  <a:schemeClr val="accent2"/>
+                </a:solidFill>
+              </a:rPr>
+              <a:t>@</a:t>
+            </a:r>
+            <a:r>
+              <a:rPr lang="en-GB" dirty="0" err="1" smtClean="0">
+                <a:solidFill>
+                  <a:schemeClr val="accent2"/>
+                </a:solidFill>
+              </a:rPr>
+              <a:t>Autowired</a:t>
+            </a:r>
+            <a:r>
+              <a:rPr lang="en-GB" dirty="0" smtClean="0">
+                <a:solidFill>
+                  <a:schemeClr val="accent2"/>
+                </a:solidFill>
+              </a:rPr>
+              <a:t> </a:t>
+            </a:r>
+            <a:r>
+              <a:rPr lang="en-GB" dirty="0" smtClean="0"/>
+              <a:t>– inject the object under test</a:t>
+            </a:r>
+          </a:p>
+          <a:p>
+            <a:pPr lvl="2"/>
+            <a:r>
+              <a:rPr lang="en-GB" dirty="0" smtClean="0">
+                <a:solidFill>
+                  <a:schemeClr val="accent2"/>
+                </a:solidFill>
+              </a:rPr>
+              <a:t>@Repeat </a:t>
+            </a:r>
+            <a:r>
+              <a:rPr lang="en-GB" dirty="0" smtClean="0"/>
+              <a:t>/ </a:t>
+            </a:r>
+            <a:r>
+              <a:rPr lang="en-GB" dirty="0" smtClean="0">
+                <a:solidFill>
+                  <a:schemeClr val="accent2"/>
+                </a:solidFill>
+              </a:rPr>
+              <a:t>@Timed </a:t>
+            </a:r>
+            <a:r>
+              <a:rPr lang="en-GB" dirty="0" smtClean="0"/>
+              <a:t>– for a test method</a:t>
+            </a:r>
+            <a:endParaRPr lang="en-GB" dirty="0"/>
+          </a:p>
+        </p:txBody>
+      </p:sp>
+    </p:spTree>
+  </p:cSld>
+  <p:clrMapOvr>
+    <a:masterClrMapping/>
+  </p:clrMapOvr>
+</p:sld>
+</file>
+
+<file path=ppt/slides/slide18.xml><?xml version="1.0" encoding="utf-8"?>
+<p:sld xmlns:a="http://schemas.openxmlformats.org/drawingml/2006/main" xmlns:r="http://schemas.openxmlformats.org/officeDocument/2006/relationships" xmlns:p="http://schemas.openxmlformats.org/presentationml/2006/main">
+  <p:cSld>
+    <p:spTree>
+      <p:nvGrpSpPr>
+        <p:cNvPr id="1" name=""/>
+        <p:cNvGrpSpPr/>
+        <p:nvPr/>
+      </p:nvGrpSpPr>
+      <p:grpSpPr>
+        <a:xfrm>
+          <a:off x="0" y="0"/>
+          <a:ext cx="0" cy="0"/>
+          <a:chOff x="0" y="0"/>
+          <a:chExt cx="0" cy="0"/>
+        </a:xfrm>
+      </p:grpSpPr>
+      <p:sp>
+        <p:nvSpPr>
+          <p:cNvPr id="2" name="Title 1"/>
+          <p:cNvSpPr>
+            <a:spLocks noGrp="1"/>
+          </p:cNvSpPr>
+          <p:nvPr>
+            <p:ph type="title"/>
+          </p:nvPr>
+        </p:nvSpPr>
+        <p:spPr/>
+        <p:txBody>
+          <a:bodyPr>
+            <a:normAutofit/>
+          </a:bodyPr>
+          <a:lstStyle/>
+          <a:p>
+            <a:r>
+              <a:rPr lang="en-GB" dirty="0" smtClean="0"/>
+              <a:t>Good habits for </a:t>
+            </a:r>
+            <a:r>
+              <a:rPr lang="en-GB" dirty="0" smtClean="0"/>
+              <a:t>Spring … </a:t>
+            </a:r>
+            <a:endParaRPr lang="en-GB" dirty="0"/>
+          </a:p>
+        </p:txBody>
+      </p:sp>
+      <p:sp>
+        <p:nvSpPr>
+          <p:cNvPr id="3" name="Content Placeholder 2"/>
+          <p:cNvSpPr>
+            <a:spLocks noGrp="1"/>
+          </p:cNvSpPr>
+          <p:nvPr>
+            <p:ph idx="1"/>
+          </p:nvPr>
+        </p:nvSpPr>
+        <p:spPr/>
+        <p:txBody>
+          <a:bodyPr>
+            <a:normAutofit fontScale="92500"/>
+          </a:bodyPr>
+          <a:lstStyle/>
+          <a:p>
+            <a:r>
+              <a:rPr lang="en-GB" dirty="0" smtClean="0"/>
+              <a:t>Use the tools</a:t>
+            </a:r>
+          </a:p>
+          <a:p>
+            <a:pPr lvl="1"/>
+            <a:r>
+              <a:rPr lang="en-GB" dirty="0" smtClean="0"/>
+              <a:t>A Spring-aware IDE will protect you from most of the simple typographic mistakes you might make</a:t>
+            </a:r>
+          </a:p>
+          <a:p>
+            <a:r>
+              <a:rPr lang="en-GB" dirty="0" smtClean="0"/>
+              <a:t>Modularise and compose configuration</a:t>
+            </a:r>
+          </a:p>
+          <a:p>
+            <a:pPr lvl="1"/>
+            <a:r>
+              <a:rPr lang="en-GB" dirty="0" smtClean="0"/>
+              <a:t>The XML files can grow at an alarming rate</a:t>
+            </a:r>
+          </a:p>
+          <a:p>
+            <a:pPr lvl="1"/>
+            <a:r>
+              <a:rPr lang="en-GB" dirty="0" smtClean="0"/>
+              <a:t>Use </a:t>
+            </a:r>
+            <a:r>
+              <a:rPr lang="en-GB" b="1" dirty="0" smtClean="0">
+                <a:solidFill>
+                  <a:schemeClr val="accent2"/>
+                </a:solidFill>
+                <a:latin typeface="Courier New" pitchFamily="49" charset="0"/>
+                <a:cs typeface="Courier New" pitchFamily="49" charset="0"/>
+              </a:rPr>
+              <a:t>&lt;import …/&gt; </a:t>
+            </a:r>
+            <a:r>
+              <a:rPr lang="en-GB" dirty="0" smtClean="0"/>
+              <a:t>to modularise e.g. by layer</a:t>
+            </a:r>
+          </a:p>
+          <a:p>
+            <a:r>
+              <a:rPr lang="en-GB" dirty="0" smtClean="0"/>
+              <a:t>Not everything needs to be a Spring bean</a:t>
+            </a:r>
+          </a:p>
+          <a:p>
+            <a:pPr lvl="1"/>
+            <a:r>
+              <a:rPr lang="en-GB" dirty="0" smtClean="0"/>
+              <a:t>Pure Java Builders, Factories etc. can manage objects that don’t need the Spring </a:t>
+            </a:r>
+            <a:r>
+              <a:rPr lang="en-GB" dirty="0" smtClean="0"/>
+              <a:t>special treatment</a:t>
+            </a:r>
+            <a:endParaRPr lang="en-GB" dirty="0" smtClean="0"/>
+          </a:p>
+        </p:txBody>
+      </p:sp>
+    </p:spTree>
+  </p:cSld>
+  <p:clrMapOvr>
+    <a:masterClrMapping/>
+  </p:clrMapOvr>
+</p:sld>
+</file>
+
+<file path=ppt/slides/slide19.xml><?xml version="1.0" encoding="utf-8"?>
+<p:sld xmlns:a="http://schemas.openxmlformats.org/drawingml/2006/main" xmlns:r="http://schemas.openxmlformats.org/officeDocument/2006/relationships" xmlns:p="http://schemas.openxmlformats.org/presentationml/2006/main">
+  <p:cSld>
+    <p:spTree>
+      <p:nvGrpSpPr>
+        <p:cNvPr id="1" name=""/>
+        <p:cNvGrpSpPr/>
+        <p:nvPr/>
+      </p:nvGrpSpPr>
+      <p:grpSpPr>
+        <a:xfrm>
+          <a:off x="0" y="0"/>
+          <a:ext cx="0" cy="0"/>
+          <a:chOff x="0" y="0"/>
+          <a:chExt cx="0" cy="0"/>
+        </a:xfrm>
+      </p:grpSpPr>
+      <p:sp>
+        <p:nvSpPr>
+          <p:cNvPr id="2" name="Title 1"/>
+          <p:cNvSpPr>
+            <a:spLocks noGrp="1"/>
+          </p:cNvSpPr>
+          <p:nvPr>
+            <p:ph type="title"/>
+          </p:nvPr>
+        </p:nvSpPr>
+        <p:spPr/>
+        <p:txBody>
           <a:bodyPr/>
           <a:lstStyle/>
           <a:p>
@@ -3946,6 +4323,10 @@
               <a:rPr lang="en-GB" dirty="0" smtClean="0"/>
               <a:t>Good habits for Spring </a:t>
             </a:r>
+            <a:r>
+              <a:rPr lang="en-GB" dirty="0" smtClean="0"/>
+              <a:t>…</a:t>
+            </a:r>
             <a:endParaRPr lang="en-GB" dirty="0"/>
           </a:p>
         </p:txBody>
@@ -3963,70 +4344,87 @@
         <p:spPr/>
         <p:txBody>
           <a:bodyPr>
-            <a:normAutofit fontScale="85000" lnSpcReduction="10000"/>
+            <a:normAutofit fontScale="92500" lnSpcReduction="10000"/>
           </a:bodyPr>
           <a:lstStyle/>
           <a:p>
             <a:r>
               <a:rPr lang="en-GB" dirty="0" smtClean="0"/>
-              <a:t>Use the tools</a:t>
+              <a:t>Use </a:t>
+            </a:r>
+            <a:r>
+              <a:rPr lang="en-GB" dirty="0" err="1" smtClean="0"/>
+              <a:t>Autowiring</a:t>
+            </a:r>
+            <a:r>
+              <a:rPr lang="en-GB" dirty="0" smtClean="0"/>
+              <a:t> carefully</a:t>
             </a:r>
           </a:p>
           <a:p>
             <a:pPr lvl="1"/>
             <a:r>
               <a:rPr lang="en-GB" dirty="0" smtClean="0"/>
-              <a:t>A Spring-aware IDE will protect you from most of the simple typographic mistakes you might make</a:t>
-            </a:r>
-          </a:p>
-          <a:p>
-            <a:r>
-              <a:rPr lang="en-GB" dirty="0" smtClean="0"/>
-              <a:t>Modularise and compose configuration</a:t>
+              <a:t>It reduces XML, but it makes configurations less explicit</a:t>
+            </a:r>
+          </a:p>
+          <a:p>
+            <a:r>
+              <a:rPr lang="en-GB" dirty="0" smtClean="0"/>
+              <a:t>Prefer constructor injection over setters</a:t>
             </a:r>
           </a:p>
           <a:p>
             <a:pPr lvl="1"/>
             <a:r>
               <a:rPr lang="en-GB" dirty="0" smtClean="0"/>
-              <a:t>The XML files can grow at an alarming rate</a:t>
+              <a:t>Although setter-injection is clearer you’ll need to take additional steps to make sure the class still works (or has meaningful errors) if not all properties are set</a:t>
+            </a:r>
+          </a:p>
+          <a:p>
+            <a:r>
+              <a:rPr lang="en-GB" dirty="0" smtClean="0"/>
+              <a:t>Prefer constructor </a:t>
+            </a:r>
+            <a:r>
+              <a:rPr lang="en-GB" b="1" dirty="0" smtClean="0">
+                <a:solidFill>
+                  <a:schemeClr val="accent2"/>
+                </a:solidFill>
+                <a:latin typeface="Courier New" pitchFamily="49" charset="0"/>
+                <a:cs typeface="Courier New" pitchFamily="49" charset="0"/>
+              </a:rPr>
+              <a:t>type=</a:t>
+            </a:r>
+            <a:r>
+              <a:rPr lang="en-GB" dirty="0" smtClean="0"/>
+              <a:t> to </a:t>
+            </a:r>
+            <a:r>
+              <a:rPr lang="en-GB" b="1" dirty="0" smtClean="0">
+                <a:solidFill>
+                  <a:schemeClr val="accent2"/>
+                </a:solidFill>
+                <a:latin typeface="Courier New" pitchFamily="49" charset="0"/>
+                <a:cs typeface="Courier New" pitchFamily="49" charset="0"/>
+              </a:rPr>
+              <a:t>index=</a:t>
             </a:r>
           </a:p>
           <a:p>
             <a:pPr lvl="1"/>
             <a:r>
               <a:rPr lang="en-GB" dirty="0" smtClean="0"/>
-              <a:t>Use &lt;import …/&gt; to modularise e.g. by layer</a:t>
-            </a:r>
-          </a:p>
-          <a:p>
-            <a:r>
-              <a:rPr lang="en-GB" dirty="0" smtClean="0"/>
-              <a:t>Not everything needs to be a Spring bean</a:t>
+              <a:t>Less brittle to change</a:t>
             </a:r>
           </a:p>
           <a:p>
             <a:pPr lvl="1"/>
             <a:r>
               <a:rPr lang="en-GB" dirty="0" smtClean="0"/>
-              <a:t>Pure Java Builders, Factories etc. can manage objects that don’t need the Spring specials</a:t>
-            </a:r>
-          </a:p>
-          <a:p>
-            <a:pPr>
-              <a:buNone/>
-            </a:pPr>
+              <a:t>Use index to remove ambiguity where necessary</a:t>
+            </a:r>
             <a:endParaRPr lang="en-GB" dirty="0"/>
-          </a:p>
-          <a:p>
-            <a:pPr>
-              <a:buNone/>
-            </a:pPr>
-            <a:r>
-              <a:rPr lang="en-GB" sz="1900" b="1" dirty="0" smtClean="0"/>
-              <a:t>http://onjava.com/pub/a/onjava/2006/01/25/spring-xml-configuration-best-practices.html</a:t>
-            </a:r>
-            <a:endParaRPr lang="en-GB" b="1" dirty="0" smtClean="0"/>
           </a:p>
         </p:txBody>
       </p:sp>
@@ -4101,7 +4499,6 @@
               <a:rPr lang="en-GB" dirty="0" smtClean="0"/>
               <a:t>“has-a” relationship</a:t>
             </a:r>
-            <a:endParaRPr lang="en-GB" dirty="0" smtClean="0"/>
           </a:p>
           <a:p>
             <a:r>
@@ -4297,6 +4694,219 @@
               <a:latin typeface="Courier New" pitchFamily="49" charset="0"/>
               <a:cs typeface="Courier New" pitchFamily="49" charset="0"/>
             </a:endParaRPr>
+          </a:p>
+        </p:txBody>
+      </p:sp>
+    </p:spTree>
+  </p:cSld>
+  <p:clrMapOvr>
+    <a:masterClrMapping/>
+  </p:clrMapOvr>
+</p:sld>
+</file>
+
+<file path=ppt/slides/slide20.xml><?xml version="1.0" encoding="utf-8"?>
+<p:sld xmlns:a="http://schemas.openxmlformats.org/drawingml/2006/main" xmlns:r="http://schemas.openxmlformats.org/officeDocument/2006/relationships" xmlns:p="http://schemas.openxmlformats.org/presentationml/2006/main">
+  <p:cSld>
+    <p:spTree>
+      <p:nvGrpSpPr>
+        <p:cNvPr id="1" name=""/>
+        <p:cNvGrpSpPr/>
+        <p:nvPr/>
+      </p:nvGrpSpPr>
+      <p:grpSpPr>
+        <a:xfrm>
+          <a:off x="0" y="0"/>
+          <a:ext cx="0" cy="0"/>
+          <a:chOff x="0" y="0"/>
+          <a:chExt cx="0" cy="0"/>
+        </a:xfrm>
+      </p:grpSpPr>
+      <p:sp>
+        <p:nvSpPr>
+          <p:cNvPr id="2" name="Title 1"/>
+          <p:cNvSpPr>
+            <a:spLocks noGrp="1"/>
+          </p:cNvSpPr>
+          <p:nvPr>
+            <p:ph type="title"/>
+          </p:nvPr>
+        </p:nvSpPr>
+        <p:spPr/>
+        <p:txBody>
+          <a:bodyPr/>
+          <a:lstStyle/>
+          <a:p>
+            <a:r>
+              <a:rPr lang="en-GB" dirty="0" smtClean="0"/>
+              <a:t>Good habits for Spring …</a:t>
+            </a:r>
+            <a:endParaRPr lang="en-GB" dirty="0"/>
+          </a:p>
+        </p:txBody>
+      </p:sp>
+      <p:sp>
+        <p:nvSpPr>
+          <p:cNvPr id="3" name="Content Placeholder 2"/>
+          <p:cNvSpPr>
+            <a:spLocks noGrp="1"/>
+          </p:cNvSpPr>
+          <p:nvPr>
+            <p:ph idx="1"/>
+          </p:nvPr>
+        </p:nvSpPr>
+        <p:spPr/>
+        <p:txBody>
+          <a:bodyPr>
+            <a:normAutofit/>
+          </a:bodyPr>
+          <a:lstStyle/>
+          <a:p>
+            <a:r>
+              <a:rPr lang="en-GB" dirty="0" smtClean="0"/>
+              <a:t>Use the shortcut forms</a:t>
+            </a:r>
+          </a:p>
+          <a:p>
+            <a:pPr lvl="1">
+              <a:buNone/>
+            </a:pPr>
+            <a:r>
+              <a:rPr lang="en-GB" sz="2400" b="1" dirty="0" smtClean="0">
+                <a:solidFill>
+                  <a:schemeClr val="accent2"/>
+                </a:solidFill>
+                <a:latin typeface="Courier New" pitchFamily="49" charset="0"/>
+                <a:cs typeface="Courier New" pitchFamily="49" charset="0"/>
+              </a:rPr>
+              <a:t>&lt;property name=“meaning” value=“42” /&gt;</a:t>
+            </a:r>
+          </a:p>
+          <a:p>
+            <a:pPr lvl="1">
+              <a:buNone/>
+            </a:pPr>
+            <a:r>
+              <a:rPr lang="en-GB" sz="2400" b="1" dirty="0" smtClean="0">
+                <a:solidFill>
+                  <a:schemeClr val="accent2"/>
+                </a:solidFill>
+                <a:latin typeface="Courier New" pitchFamily="49" charset="0"/>
+                <a:cs typeface="Courier New" pitchFamily="49" charset="0"/>
+              </a:rPr>
+              <a:t>&lt;constructor-</a:t>
+            </a:r>
+            <a:r>
+              <a:rPr lang="en-GB" sz="2400" b="1" dirty="0" err="1" smtClean="0">
+                <a:solidFill>
+                  <a:schemeClr val="accent2"/>
+                </a:solidFill>
+                <a:latin typeface="Courier New" pitchFamily="49" charset="0"/>
+                <a:cs typeface="Courier New" pitchFamily="49" charset="0"/>
+              </a:rPr>
+              <a:t>arg</a:t>
+            </a:r>
+            <a:r>
+              <a:rPr lang="en-GB" sz="2400" b="1" dirty="0" smtClean="0">
+                <a:solidFill>
+                  <a:schemeClr val="accent2"/>
+                </a:solidFill>
+                <a:latin typeface="Courier New" pitchFamily="49" charset="0"/>
+                <a:cs typeface="Courier New" pitchFamily="49" charset="0"/>
+              </a:rPr>
+              <a:t> ref=“</a:t>
+            </a:r>
+            <a:r>
+              <a:rPr lang="en-GB" sz="2400" b="1" dirty="0" err="1" smtClean="0">
+                <a:solidFill>
+                  <a:schemeClr val="accent2"/>
+                </a:solidFill>
+                <a:latin typeface="Courier New" pitchFamily="49" charset="0"/>
+                <a:cs typeface="Courier New" pitchFamily="49" charset="0"/>
+              </a:rPr>
+              <a:t>deepThoughtDAO</a:t>
+            </a:r>
+            <a:r>
+              <a:rPr lang="en-GB" sz="2400" b="1" dirty="0" smtClean="0">
+                <a:solidFill>
+                  <a:schemeClr val="accent2"/>
+                </a:solidFill>
+                <a:latin typeface="Courier New" pitchFamily="49" charset="0"/>
+                <a:cs typeface="Courier New" pitchFamily="49" charset="0"/>
+              </a:rPr>
+              <a:t>” /&gt;</a:t>
+            </a:r>
+          </a:p>
+          <a:p>
+            <a:r>
+              <a:rPr lang="en-GB" dirty="0" smtClean="0"/>
+              <a:t>Use inner beans where appropriate</a:t>
+            </a:r>
+          </a:p>
+          <a:p>
+            <a:r>
+              <a:rPr lang="en-GB" dirty="0" smtClean="0"/>
+              <a:t>Use abstract beans to reduce duplication</a:t>
+            </a:r>
+          </a:p>
+          <a:p>
+            <a:pPr lvl="1"/>
+            <a:r>
+              <a:rPr lang="en-GB" dirty="0" smtClean="0"/>
+              <a:t>Inherit common configuration </a:t>
+            </a:r>
+            <a:r>
+              <a:rPr lang="en-GB" b="1" dirty="0" smtClean="0">
+                <a:solidFill>
+                  <a:schemeClr val="accent2"/>
+                </a:solidFill>
+                <a:latin typeface="Courier New" pitchFamily="49" charset="0"/>
+                <a:cs typeface="Courier New" pitchFamily="49" charset="0"/>
+              </a:rPr>
+              <a:t>parent=“…”</a:t>
+            </a:r>
+          </a:p>
+          <a:p>
+            <a:r>
+              <a:rPr lang="en-GB" dirty="0" smtClean="0"/>
+              <a:t>Prefer </a:t>
+            </a:r>
+            <a:r>
+              <a:rPr lang="en-GB" b="1" dirty="0" smtClean="0">
+                <a:solidFill>
+                  <a:schemeClr val="accent2"/>
+                </a:solidFill>
+                <a:latin typeface="Courier New" pitchFamily="49" charset="0"/>
+                <a:cs typeface="Courier New" pitchFamily="49" charset="0"/>
+              </a:rPr>
+              <a:t>id=</a:t>
+            </a:r>
+            <a:r>
+              <a:rPr lang="en-GB" b="1" dirty="0" smtClean="0">
+                <a:latin typeface="Courier New" pitchFamily="49" charset="0"/>
+                <a:cs typeface="Courier New" pitchFamily="49" charset="0"/>
+              </a:rPr>
+              <a:t> </a:t>
+            </a:r>
+            <a:r>
+              <a:rPr lang="en-GB" dirty="0" smtClean="0"/>
+              <a:t>over </a:t>
+            </a:r>
+            <a:r>
+              <a:rPr lang="en-GB" b="1" dirty="0" smtClean="0">
+                <a:solidFill>
+                  <a:schemeClr val="accent2"/>
+                </a:solidFill>
+                <a:latin typeface="Courier New" pitchFamily="49" charset="0"/>
+                <a:cs typeface="Courier New" pitchFamily="49" charset="0"/>
+              </a:rPr>
+              <a:t>name=</a:t>
+            </a:r>
+            <a:r>
+              <a:rPr lang="en-GB" dirty="0" smtClean="0"/>
+              <a:t> to trap accidental name conflicts</a:t>
+            </a:r>
+            <a:endParaRPr lang="en-GB" dirty="0"/>
           </a:p>
         </p:txBody>
       </p:sp>

</xml_diff>

<commit_message>
Fixed some typos on the slides
</commit_message>
<xml_diff>
--- a/Spring + Hibernate.pptx
+++ b/Spring + Hibernate.pptx
@@ -4186,11 +4186,7 @@
           <a:p>
             <a:r>
               <a:rPr lang="en-GB" dirty="0" smtClean="0"/>
-              <a:t>Good habits for </a:t>
-            </a:r>
-            <a:r>
-              <a:rPr lang="en-GB" dirty="0" smtClean="0"/>
-              <a:t>Spring … </a:t>
+              <a:t>Good habits for Spring … </a:t>
             </a:r>
             <a:endParaRPr lang="en-GB" dirty="0"/>
           </a:p>
@@ -4269,13 +4265,8 @@
             <a:pPr lvl="1"/>
             <a:r>
               <a:rPr lang="en-GB" dirty="0" smtClean="0"/>
-              <a:t>Pure Java Builders, Factories etc. can manage objects that don’t need the Spring </a:t>
-            </a:r>
-            <a:r>
-              <a:rPr lang="en-GB" dirty="0" smtClean="0"/>
-              <a:t>special treatment</a:t>
-            </a:r>
-            <a:endParaRPr lang="en-GB" dirty="0" smtClean="0"/>
+              <a:t>Pure Java Builders, Factories etc. can manage objects that don’t need the Spring special treatment</a:t>
+            </a:r>
           </a:p>
         </p:txBody>
       </p:sp>
@@ -4321,11 +4312,7 @@
           <a:p>
             <a:r>
               <a:rPr lang="en-GB" dirty="0" smtClean="0"/>
-              <a:t>Good habits for Spring </a:t>
-            </a:r>
-            <a:r>
-              <a:rPr lang="en-GB" dirty="0" smtClean="0"/>
-              <a:t>…</a:t>
+              <a:t>Good habits for Spring …</a:t>
             </a:r>
             <a:endParaRPr lang="en-GB" dirty="0"/>
           </a:p>
@@ -6595,8 +6582,8 @@
           <p:nvPr/>
         </p:nvSpPr>
         <p:spPr>
-          <a:xfrm rot="3313104">
-            <a:off x="3107567" y="4255832"/>
+          <a:xfrm>
+            <a:off x="3203848" y="3789040"/>
             <a:ext cx="1154483" cy="369332"/>
           </a:xfrm>
           <a:prstGeom prst="rect">
@@ -7191,8 +7178,9 @@
             <a:pPr algn="ctr"/>
             <a:r>
               <a:rPr lang="en-GB" dirty="0" smtClean="0"/>
-              <a:t>Simple</a:t>
-            </a:r>
+              <a:t>Complex</a:t>
+            </a:r>
+            <a:endParaRPr lang="en-GB" dirty="0" smtClean="0"/>
           </a:p>
           <a:p>
             <a:pPr algn="ctr"/>
@@ -8325,8 +8313,9 @@
             <a:pPr algn="ctr"/>
             <a:r>
               <a:rPr lang="en-GB" dirty="0" smtClean="0"/>
-              <a:t>Simple</a:t>
-            </a:r>
+              <a:t>Complex</a:t>
+            </a:r>
+            <a:endParaRPr lang="en-GB" dirty="0" smtClean="0"/>
           </a:p>
           <a:p>
             <a:pPr algn="ctr"/>

</xml_diff>

<commit_message>
Sync with SVN Slides updated with timings
</commit_message>
<xml_diff>
--- a/Spring + Hibernate.pptx
+++ b/Spring + Hibernate.pptx
@@ -308,7 +308,7 @@
             <a:fld id="{F1F6951F-1DFC-44F2-B12D-F691ACE09490}" type="datetimeFigureOut">
               <a:rPr lang="en-GB" smtClean="0"/>
               <a:pPr/>
-              <a:t>08/02/2011</a:t>
+              <a:t>09/02/2011</a:t>
             </a:fld>
             <a:endParaRPr lang="en-GB"/>
           </a:p>
@@ -475,7 +475,7 @@
             <a:fld id="{F1F6951F-1DFC-44F2-B12D-F691ACE09490}" type="datetimeFigureOut">
               <a:rPr lang="en-GB" smtClean="0"/>
               <a:pPr/>
-              <a:t>08/02/2011</a:t>
+              <a:t>09/02/2011</a:t>
             </a:fld>
             <a:endParaRPr lang="en-GB"/>
           </a:p>
@@ -652,7 +652,7 @@
             <a:fld id="{F1F6951F-1DFC-44F2-B12D-F691ACE09490}" type="datetimeFigureOut">
               <a:rPr lang="en-GB" smtClean="0"/>
               <a:pPr/>
-              <a:t>08/02/2011</a:t>
+              <a:t>09/02/2011</a:t>
             </a:fld>
             <a:endParaRPr lang="en-GB"/>
           </a:p>
@@ -819,7 +819,7 @@
             <a:fld id="{F1F6951F-1DFC-44F2-B12D-F691ACE09490}" type="datetimeFigureOut">
               <a:rPr lang="en-GB" smtClean="0"/>
               <a:pPr/>
-              <a:t>08/02/2011</a:t>
+              <a:t>09/02/2011</a:t>
             </a:fld>
             <a:endParaRPr lang="en-GB"/>
           </a:p>
@@ -1062,7 +1062,7 @@
             <a:fld id="{F1F6951F-1DFC-44F2-B12D-F691ACE09490}" type="datetimeFigureOut">
               <a:rPr lang="en-GB" smtClean="0"/>
               <a:pPr/>
-              <a:t>08/02/2011</a:t>
+              <a:t>09/02/2011</a:t>
             </a:fld>
             <a:endParaRPr lang="en-GB"/>
           </a:p>
@@ -1347,7 +1347,7 @@
             <a:fld id="{F1F6951F-1DFC-44F2-B12D-F691ACE09490}" type="datetimeFigureOut">
               <a:rPr lang="en-GB" smtClean="0"/>
               <a:pPr/>
-              <a:t>08/02/2011</a:t>
+              <a:t>09/02/2011</a:t>
             </a:fld>
             <a:endParaRPr lang="en-GB"/>
           </a:p>
@@ -1766,7 +1766,7 @@
             <a:fld id="{F1F6951F-1DFC-44F2-B12D-F691ACE09490}" type="datetimeFigureOut">
               <a:rPr lang="en-GB" smtClean="0"/>
               <a:pPr/>
-              <a:t>08/02/2011</a:t>
+              <a:t>09/02/2011</a:t>
             </a:fld>
             <a:endParaRPr lang="en-GB"/>
           </a:p>
@@ -1881,7 +1881,7 @@
             <a:fld id="{F1F6951F-1DFC-44F2-B12D-F691ACE09490}" type="datetimeFigureOut">
               <a:rPr lang="en-GB" smtClean="0"/>
               <a:pPr/>
-              <a:t>08/02/2011</a:t>
+              <a:t>09/02/2011</a:t>
             </a:fld>
             <a:endParaRPr lang="en-GB"/>
           </a:p>
@@ -1973,7 +1973,7 @@
             <a:fld id="{F1F6951F-1DFC-44F2-B12D-F691ACE09490}" type="datetimeFigureOut">
               <a:rPr lang="en-GB" smtClean="0"/>
               <a:pPr/>
-              <a:t>08/02/2011</a:t>
+              <a:t>09/02/2011</a:t>
             </a:fld>
             <a:endParaRPr lang="en-GB"/>
           </a:p>
@@ -2247,7 +2247,7 @@
             <a:fld id="{F1F6951F-1DFC-44F2-B12D-F691ACE09490}" type="datetimeFigureOut">
               <a:rPr lang="en-GB" smtClean="0"/>
               <a:pPr/>
-              <a:t>08/02/2011</a:t>
+              <a:t>09/02/2011</a:t>
             </a:fld>
             <a:endParaRPr lang="en-GB"/>
           </a:p>
@@ -2497,7 +2497,7 @@
             <a:fld id="{F1F6951F-1DFC-44F2-B12D-F691ACE09490}" type="datetimeFigureOut">
               <a:rPr lang="en-GB" smtClean="0"/>
               <a:pPr/>
-              <a:t>08/02/2011</a:t>
+              <a:t>09/02/2011</a:t>
             </a:fld>
             <a:endParaRPr lang="en-GB"/>
           </a:p>
@@ -2707,7 +2707,7 @@
             <a:fld id="{F1F6951F-1DFC-44F2-B12D-F691ACE09490}" type="datetimeFigureOut">
               <a:rPr lang="en-GB" smtClean="0"/>
               <a:pPr/>
-              <a:t>08/02/2011</a:t>
+              <a:t>09/02/2011</a:t>
             </a:fld>
             <a:endParaRPr lang="en-GB"/>
           </a:p>
@@ -3172,7 +3172,11 @@
           <a:p>
             <a:r>
               <a:rPr lang="en-GB" dirty="0" smtClean="0"/>
-              <a:t>Exercise 4</a:t>
+              <a:t>Exercise </a:t>
+            </a:r>
+            <a:r>
+              <a:rPr lang="en-GB" dirty="0" smtClean="0"/>
+              <a:t>4 (10 minutes)</a:t>
             </a:r>
             <a:endParaRPr lang="en-GB" dirty="0"/>
           </a:p>
@@ -3396,7 +3400,11 @@
           <a:p>
             <a:r>
               <a:rPr lang="en-GB" dirty="0" smtClean="0"/>
-              <a:t>Exercise 5</a:t>
+              <a:t>Exercise </a:t>
+            </a:r>
+            <a:r>
+              <a:rPr lang="en-GB" dirty="0" smtClean="0"/>
+              <a:t>5 (10 minutes)</a:t>
             </a:r>
             <a:endParaRPr lang="en-GB" dirty="0"/>
           </a:p>
@@ -3505,7 +3513,15 @@
             <a:pPr lvl="1"/>
             <a:r>
               <a:rPr lang="en-GB" dirty="0" smtClean="0"/>
-              <a:t>Google Guise, Pico-container</a:t>
+              <a:t>Google </a:t>
+            </a:r>
+            <a:r>
+              <a:rPr lang="en-GB" dirty="0" err="1" smtClean="0"/>
+              <a:t>Guice</a:t>
+            </a:r>
+            <a:r>
+              <a:rPr lang="en-GB" dirty="0" smtClean="0"/>
+              <a:t>, Pico-container</a:t>
             </a:r>
           </a:p>
           <a:p>
@@ -3559,7 +3575,11 @@
           <a:p>
             <a:r>
               <a:rPr lang="en-GB" dirty="0" smtClean="0"/>
-              <a:t>Exercise 6</a:t>
+              <a:t>Exercise </a:t>
+            </a:r>
+            <a:r>
+              <a:rPr lang="en-GB" dirty="0" smtClean="0"/>
+              <a:t>6 (10 minutes)</a:t>
             </a:r>
             <a:endParaRPr lang="en-GB" dirty="0"/>
           </a:p>
@@ -3859,7 +3879,11 @@
           <a:p>
             <a:r>
               <a:rPr lang="en-GB" dirty="0" smtClean="0"/>
-              <a:t>Exercise 7</a:t>
+              <a:t>Exercise </a:t>
+            </a:r>
+            <a:r>
+              <a:rPr lang="en-GB" dirty="0" smtClean="0"/>
+              <a:t>7 (10 minutes)</a:t>
             </a:r>
             <a:endParaRPr lang="en-GB" dirty="0"/>
           </a:p>
@@ -4939,7 +4963,11 @@
           <a:p>
             <a:r>
               <a:rPr lang="en-GB" dirty="0" smtClean="0"/>
-              <a:t>Exercise 1</a:t>
+              <a:t>Exercise </a:t>
+            </a:r>
+            <a:r>
+              <a:rPr lang="en-GB" dirty="0" smtClean="0"/>
+              <a:t>1 (5 minutes)</a:t>
             </a:r>
             <a:endParaRPr lang="en-GB" dirty="0"/>
           </a:p>
@@ -6707,7 +6735,19 @@
           <a:p>
             <a:r>
               <a:rPr lang="en-GB" dirty="0" smtClean="0"/>
-              <a:t>Exercise 2</a:t>
+              <a:t>Exercise </a:t>
+            </a:r>
+            <a:r>
+              <a:rPr lang="en-GB" dirty="0" smtClean="0"/>
+              <a:t>2 </a:t>
+            </a:r>
+            <a:r>
+              <a:rPr lang="en-GB" dirty="0" smtClean="0"/>
+              <a:t>(10 </a:t>
+            </a:r>
+            <a:r>
+              <a:rPr lang="en-GB" dirty="0" smtClean="0"/>
+              <a:t>minutes)</a:t>
             </a:r>
             <a:endParaRPr lang="en-GB" dirty="0"/>
           </a:p>
@@ -7180,7 +7220,6 @@
               <a:rPr lang="en-GB" dirty="0" smtClean="0"/>
               <a:t>Complex</a:t>
             </a:r>
-            <a:endParaRPr lang="en-GB" dirty="0" smtClean="0"/>
           </a:p>
           <a:p>
             <a:pPr algn="ctr"/>
@@ -7847,7 +7886,11 @@
           <a:p>
             <a:r>
               <a:rPr lang="en-GB" dirty="0" smtClean="0"/>
-              <a:t>Exercise 3</a:t>
+              <a:t>Exercise </a:t>
+            </a:r>
+            <a:r>
+              <a:rPr lang="en-GB" dirty="0" smtClean="0"/>
+              <a:t>3 (10 minutes)</a:t>
             </a:r>
             <a:endParaRPr lang="en-GB" dirty="0"/>
           </a:p>
@@ -8315,7 +8358,6 @@
               <a:rPr lang="en-GB" dirty="0" smtClean="0"/>
               <a:t>Complex</a:t>
             </a:r>
-            <a:endParaRPr lang="en-GB" dirty="0" smtClean="0"/>
           </a:p>
           <a:p>
             <a:pPr algn="ctr"/>

</xml_diff>